<commit_message>
add FP_induction_nn1 PS_generalized_postage edit mid1 draft
</commit_message>
<xml_diff>
--- a/fall15/slidesF15/proofs1.pptx
+++ b/fall15/slidesF15/proofs1.pptx
@@ -5,10 +5,10 @@
     <p:sldMasterId id="2147483650" r:id="rId1"/>
   </p:sldMasterIdLst>
   <p:notesMasterIdLst>
-    <p:notesMasterId r:id="rId24"/>
+    <p:notesMasterId r:id="rId25"/>
   </p:notesMasterIdLst>
   <p:handoutMasterIdLst>
-    <p:handoutMasterId r:id="rId25"/>
+    <p:handoutMasterId r:id="rId26"/>
   </p:handoutMasterIdLst>
   <p:sldIdLst>
     <p:sldId id="306" r:id="rId2"/>
@@ -25,19 +25,20 @@
     <p:sldId id="357" r:id="rId13"/>
     <p:sldId id="354" r:id="rId14"/>
     <p:sldId id="288" r:id="rId15"/>
-    <p:sldId id="319" r:id="rId16"/>
-    <p:sldId id="320" r:id="rId17"/>
-    <p:sldId id="308" r:id="rId18"/>
-    <p:sldId id="298" r:id="rId19"/>
-    <p:sldId id="342" r:id="rId20"/>
-    <p:sldId id="289" r:id="rId21"/>
-    <p:sldId id="302" r:id="rId22"/>
-    <p:sldId id="266" r:id="rId23"/>
+    <p:sldId id="358" r:id="rId16"/>
+    <p:sldId id="319" r:id="rId17"/>
+    <p:sldId id="320" r:id="rId18"/>
+    <p:sldId id="308" r:id="rId19"/>
+    <p:sldId id="298" r:id="rId20"/>
+    <p:sldId id="342" r:id="rId21"/>
+    <p:sldId id="289" r:id="rId22"/>
+    <p:sldId id="302" r:id="rId23"/>
+    <p:sldId id="266" r:id="rId24"/>
   </p:sldIdLst>
   <p:sldSz cx="9144000" cy="6858000" type="screen4x3"/>
   <p:notesSz cx="9601200" cy="7315200"/>
   <p:custDataLst>
-    <p:tags r:id="rId27"/>
+    <p:tags r:id="rId28"/>
   </p:custDataLst>
   <p:defaultTextStyle>
     <a:defPPr>
@@ -1320,7 +1321,7 @@
             <a:fld id="{61C0D827-3B30-41B3-844D-02406EF0DDDE}" type="slidenum">
               <a:rPr lang="en-US" smtClean="0"/>
               <a:pPr/>
-              <a:t>15</a:t>
+              <a:t>16</a:t>
             </a:fld>
             <a:endParaRPr lang="en-US" smtClean="0"/>
           </a:p>
@@ -1408,7 +1409,7 @@
             <a:fld id="{7ADFF96C-1126-4FE2-8812-2235E28F31C8}" type="slidenum">
               <a:rPr lang="en-US" smtClean="0"/>
               <a:pPr/>
-              <a:t>16</a:t>
+              <a:t>17</a:t>
             </a:fld>
             <a:endParaRPr lang="en-US" smtClean="0"/>
           </a:p>
@@ -1496,7 +1497,7 @@
             <a:fld id="{E1AB1F72-E3CC-4931-BF03-3C0BE4D7A4E3}" type="slidenum">
               <a:rPr lang="en-US" smtClean="0"/>
               <a:pPr/>
-              <a:t>17</a:t>
+              <a:t>18</a:t>
             </a:fld>
             <a:endParaRPr lang="en-US" smtClean="0"/>
           </a:p>
@@ -1584,7 +1585,7 @@
             <a:fld id="{AB383728-4ACD-45AA-AE8F-C481528D9881}" type="slidenum">
               <a:rPr lang="en-US" smtClean="0"/>
               <a:pPr/>
-              <a:t>18</a:t>
+              <a:t>19</a:t>
             </a:fld>
             <a:endParaRPr lang="en-US" smtClean="0"/>
           </a:p>
@@ -1672,7 +1673,7 @@
             <a:fld id="{37E283DA-5899-48F3-84C6-6483C00AB4A7}" type="slidenum">
               <a:rPr lang="en-US" smtClean="0"/>
               <a:pPr/>
-              <a:t>19</a:t>
+              <a:t>20</a:t>
             </a:fld>
             <a:endParaRPr lang="en-US" smtClean="0"/>
           </a:p>
@@ -1760,7 +1761,7 @@
             <a:fld id="{37E283DA-5899-48F3-84C6-6483C00AB4A7}" type="slidenum">
               <a:rPr lang="en-US" smtClean="0"/>
               <a:pPr/>
-              <a:t>20</a:t>
+              <a:t>21</a:t>
             </a:fld>
             <a:endParaRPr lang="en-US" smtClean="0"/>
           </a:p>
@@ -1936,7 +1937,7 @@
             <a:fld id="{8E7D3159-B9DE-441B-A62B-B74582C5B49E}" type="slidenum">
               <a:rPr lang="en-US" smtClean="0"/>
               <a:pPr/>
-              <a:t>21</a:t>
+              <a:t>22</a:t>
             </a:fld>
             <a:endParaRPr lang="en-US" smtClean="0"/>
           </a:p>
@@ -2024,7 +2025,7 @@
             <a:fld id="{20F44D78-E584-4667-AD79-A0C4664A329D}" type="slidenum">
               <a:rPr lang="en-US" smtClean="0"/>
               <a:pPr/>
-              <a:t>22</a:t>
+              <a:t>23</a:t>
             </a:fld>
             <a:endParaRPr lang="en-US" smtClean="0"/>
           </a:p>
@@ -5640,7 +5641,7 @@
           <a:graphicData uri="http://schemas.openxmlformats.org/presentationml/2006/ole">
             <mc:AlternateContent xmlns:mc="http://schemas.openxmlformats.org/markup-compatibility/2006">
               <mc:Choice xmlns:v="urn:schemas-microsoft-com:vml" Requires="v">
-                <p:oleObj spid="_x0000_s1210" name="Equation" r:id="rId4" imgW="914400" imgH="215640" progId="Equation.3">
+                <p:oleObj spid="_x0000_s1219" name="Equation" r:id="rId4" imgW="914400" imgH="215640" progId="Equation.3">
                   <p:embed/>
                 </p:oleObj>
               </mc:Choice>
@@ -5710,7 +5711,7 @@
           <a:graphicData uri="http://schemas.openxmlformats.org/presentationml/2006/ole">
             <mc:AlternateContent xmlns:mc="http://schemas.openxmlformats.org/markup-compatibility/2006">
               <mc:Choice xmlns:v="urn:schemas-microsoft-com:vml" Requires="v">
-                <p:oleObj spid="_x0000_s1211" name="Equation" r:id="rId6" imgW="914400" imgH="215640" progId="Equation.3">
+                <p:oleObj spid="_x0000_s1220" name="Equation" r:id="rId6" imgW="914400" imgH="215640" progId="Equation.3">
                   <p:embed/>
                 </p:oleObj>
               </mc:Choice>
@@ -11157,6 +11158,293 @@
       </p:grpSpPr>
       <p:sp>
         <p:nvSpPr>
+          <p:cNvPr id="2" name="Title 1"/>
+          <p:cNvSpPr>
+            <a:spLocks noGrp="1"/>
+          </p:cNvSpPr>
+          <p:nvPr>
+            <p:ph type="title"/>
+          </p:nvPr>
+        </p:nvSpPr>
+        <p:spPr/>
+        <p:txBody>
+          <a:bodyPr/>
+          <a:lstStyle/>
+          <a:p>
+            <a:r>
+              <a:rPr lang="en-US" dirty="0" smtClean="0"/>
+              <a:t>More Bogus Picture Proofs</a:t>
+            </a:r>
+            <a:endParaRPr lang="en-US" dirty="0"/>
+          </a:p>
+        </p:txBody>
+      </p:sp>
+      <p:sp>
+        <p:nvSpPr>
+          <p:cNvPr id="3" name="Slide Number Placeholder 2"/>
+          <p:cNvSpPr>
+            <a:spLocks noGrp="1"/>
+          </p:cNvSpPr>
+          <p:nvPr>
+            <p:ph type="sldNum" sz="quarter" idx="10"/>
+          </p:nvPr>
+        </p:nvSpPr>
+        <p:spPr/>
+        <p:txBody>
+          <a:bodyPr/>
+          <a:lstStyle/>
+          <a:p>
+            <a:pPr>
+              <a:defRPr/>
+            </a:pPr>
+            <a:r>
+              <a:rPr lang="en-US" sz="1200" smtClean="0"/>
+              <a:t>   proofintro.I.</a:t>
+            </a:r>
+            <a:fld id="{1CDF22EC-3157-477E-AA23-4E375917539F}" type="slidenum">
+              <a:rPr lang="en-US" sz="1200" smtClean="0"/>
+              <a:pPr>
+                <a:defRPr/>
+              </a:pPr>
+              <a:t>15</a:t>
+            </a:fld>
+            <a:endParaRPr lang="en-US" sz="1200" dirty="0"/>
+          </a:p>
+        </p:txBody>
+      </p:sp>
+      <p:sp>
+        <p:nvSpPr>
+          <p:cNvPr id="4" name="TextBox 3"/>
+          <p:cNvSpPr txBox="1"/>
+          <p:nvPr/>
+        </p:nvSpPr>
+        <p:spPr>
+          <a:xfrm>
+            <a:off x="247484" y="1337370"/>
+            <a:ext cx="8652207" cy="6432530"/>
+          </a:xfrm>
+          <a:prstGeom prst="rect">
+            <a:avLst/>
+          </a:prstGeom>
+          <a:noFill/>
+        </p:spPr>
+        <p:txBody>
+          <a:bodyPr wrap="square" rtlCol="0">
+            <a:spAutoFit/>
+          </a:bodyPr>
+          <a:lstStyle/>
+          <a:p>
+            <a:pPr algn="l"/>
+            <a:r>
+              <a:rPr lang="en-US" sz="4000" dirty="0" smtClean="0">
+                <a:latin typeface="Comic Sans MS"/>
+                <a:cs typeface="Comic Sans MS"/>
+              </a:rPr>
+              <a:t>Lots of good examples,</a:t>
+            </a:r>
+          </a:p>
+          <a:p>
+            <a:pPr algn="l"/>
+            <a:r>
+              <a:rPr lang="en-US" sz="4000" dirty="0" smtClean="0">
+                <a:latin typeface="Comic Sans MS"/>
+                <a:cs typeface="Comic Sans MS"/>
+              </a:rPr>
+              <a:t>for example:</a:t>
+            </a:r>
+          </a:p>
+          <a:p>
+            <a:pPr algn="l"/>
+            <a:r>
+              <a:rPr lang="en-US" sz="3600" dirty="0" smtClean="0">
+                <a:latin typeface="Arial"/>
+                <a:cs typeface="Arial"/>
+              </a:rPr>
+              <a:t>  Gardner, Martin</a:t>
+            </a:r>
+          </a:p>
+          <a:p>
+            <a:pPr algn="l"/>
+            <a:r>
+              <a:rPr lang="en-US" sz="3600" i="1" dirty="0" smtClean="0">
+                <a:latin typeface="Arial"/>
+                <a:cs typeface="Arial"/>
+              </a:rPr>
+              <a:t>  Mathematics</a:t>
+            </a:r>
+            <a:r>
+              <a:rPr lang="en-US" sz="3600" i="1" dirty="0">
+                <a:latin typeface="Arial"/>
+                <a:cs typeface="Arial"/>
+              </a:rPr>
+              <a:t>, Magic and </a:t>
+            </a:r>
+            <a:r>
+              <a:rPr lang="en-US" sz="3600" i="1" dirty="0" smtClean="0">
+                <a:latin typeface="Arial"/>
+                <a:cs typeface="Arial"/>
+              </a:rPr>
+              <a:t>Mystery</a:t>
+            </a:r>
+          </a:p>
+          <a:p>
+            <a:pPr algn="l"/>
+            <a:r>
+              <a:rPr lang="en-US" sz="3600" dirty="0" smtClean="0">
+                <a:latin typeface="Arial"/>
+                <a:cs typeface="Arial"/>
+              </a:rPr>
+              <a:t>  (</a:t>
+            </a:r>
+            <a:r>
+              <a:rPr lang="en-US" sz="3600" dirty="0">
+                <a:latin typeface="Arial"/>
+                <a:cs typeface="Arial"/>
+              </a:rPr>
+              <a:t>Dover, 1956, 12 + </a:t>
+            </a:r>
+            <a:r>
+              <a:rPr lang="en-US" sz="3600" dirty="0" smtClean="0">
+                <a:latin typeface="Arial"/>
+                <a:cs typeface="Arial"/>
+              </a:rPr>
+              <a:t>176)</a:t>
+            </a:r>
+            <a:r>
+              <a:rPr lang="en-US" sz="3600" dirty="0" smtClean="0">
+                <a:latin typeface="Comic Sans MS"/>
+                <a:cs typeface="Comic Sans MS"/>
+              </a:rPr>
+              <a:t> </a:t>
+            </a:r>
+          </a:p>
+          <a:p>
+            <a:pPr algn="l"/>
+            <a:r>
+              <a:rPr lang="en-US" sz="2400" dirty="0" smtClean="0">
+                <a:latin typeface="Comic Sans MS"/>
+                <a:cs typeface="Comic Sans MS"/>
+              </a:rPr>
+              <a:t>  </a:t>
+            </a:r>
+            <a:r>
+              <a:rPr lang="en-US" sz="2400" dirty="0" smtClean="0">
+                <a:latin typeface="Comic Sans MS"/>
+                <a:cs typeface="Comic Sans MS"/>
+                <a:hlinkClick r:id="rId2"/>
+              </a:rPr>
+              <a:t>http</a:t>
+            </a:r>
+            <a:r>
+              <a:rPr lang="en-US" sz="2400" dirty="0">
+                <a:latin typeface="Comic Sans MS"/>
+                <a:cs typeface="Comic Sans MS"/>
+                <a:hlinkClick r:id="rId2"/>
+              </a:rPr>
+              <a:t>://</a:t>
+            </a:r>
+            <a:r>
+              <a:rPr lang="en-US" sz="2400" dirty="0" err="1">
+                <a:latin typeface="Comic Sans MS"/>
+                <a:cs typeface="Comic Sans MS"/>
+                <a:hlinkClick r:id="rId2"/>
+              </a:rPr>
+              <a:t>store.doverpublications.com</a:t>
+            </a:r>
+            <a:r>
+              <a:rPr lang="en-US" sz="2400" dirty="0">
+                <a:latin typeface="Comic Sans MS"/>
+                <a:cs typeface="Comic Sans MS"/>
+                <a:hlinkClick r:id="rId2"/>
+              </a:rPr>
+              <a:t>/0486203352.html</a:t>
+            </a:r>
+            <a:endParaRPr lang="en-US" sz="2400" dirty="0">
+              <a:latin typeface="Comic Sans MS"/>
+              <a:cs typeface="Comic Sans MS"/>
+            </a:endParaRPr>
+          </a:p>
+          <a:p>
+            <a:pPr algn="l"/>
+            <a:r>
+              <a:rPr lang="en-US" sz="4000" dirty="0" err="1" smtClean="0">
+                <a:latin typeface="Comic Sans MS"/>
+                <a:cs typeface="Comic Sans MS"/>
+              </a:rPr>
+              <a:t>or</a:t>
+            </a:r>
+            <a:r>
+              <a:rPr lang="en-US" sz="4000" dirty="0" err="1" smtClean="0">
+                <a:hlinkClick r:id="rId3"/>
+              </a:rPr>
+              <a:t>https</a:t>
+            </a:r>
+            <a:r>
+              <a:rPr lang="en-US" sz="4000" dirty="0">
+                <a:hlinkClick r:id="rId3"/>
+              </a:rPr>
+              <a:t>://en.m.wikipedia.org/wiki/Missing_square_puzzle</a:t>
+            </a:r>
+            <a:endParaRPr lang="en-US" sz="4000" dirty="0"/>
+          </a:p>
+          <a:p>
+            <a:pPr algn="l"/>
+            <a:endParaRPr lang="en-US" sz="4000" dirty="0" smtClean="0">
+              <a:latin typeface="Comic Sans MS"/>
+              <a:cs typeface="Comic Sans MS"/>
+            </a:endParaRPr>
+          </a:p>
+          <a:p>
+            <a:pPr algn="l"/>
+            <a:endParaRPr lang="en-US" sz="4000" dirty="0" smtClean="0">
+              <a:latin typeface="Comic Sans MS"/>
+              <a:cs typeface="Comic Sans MS"/>
+            </a:endParaRPr>
+          </a:p>
+        </p:txBody>
+      </p:sp>
+    </p:spTree>
+    <p:extLst>
+      <p:ext uri="{BB962C8B-B14F-4D97-AF65-F5344CB8AC3E}">
+        <p14:creationId xmlns:p14="http://schemas.microsoft.com/office/powerpoint/2010/main" val="3530300016"/>
+      </p:ext>
+    </p:extLst>
+  </p:cSld>
+  <p:clrMapOvr>
+    <a:masterClrMapping/>
+  </p:clrMapOvr>
+  <p:transition xmlns:p14="http://schemas.microsoft.com/office/powerpoint/2010/main" spd="slow">
+    <p:fade/>
+  </p:transition>
+  <p:timing>
+    <p:tnLst>
+      <p:par>
+        <p:cTn xmlns:p14="http://schemas.microsoft.com/office/powerpoint/2010/main" id="1" dur="indefinite" restart="never" nodeType="tmRoot"/>
+      </p:par>
+    </p:tnLst>
+  </p:timing>
+</p:sld>
+</file>
+
+<file path=ppt/slides/slide16.xml><?xml version="1.0" encoding="utf-8"?>
+<p:sld xmlns:a="http://schemas.openxmlformats.org/drawingml/2006/main" xmlns:r="http://schemas.openxmlformats.org/officeDocument/2006/relationships" xmlns:p="http://schemas.openxmlformats.org/presentationml/2006/main">
+  <p:cSld>
+    <p:spTree>
+      <p:nvGrpSpPr>
+        <p:cNvPr id="1" name=""/>
+        <p:cNvGrpSpPr/>
+        <p:nvPr/>
+      </p:nvGrpSpPr>
+      <p:grpSpPr>
+        <a:xfrm>
+          <a:off x="0" y="0"/>
+          <a:ext cx="0" cy="0"/>
+          <a:chOff x="0" y="0"/>
+          <a:chExt cx="0" cy="0"/>
+        </a:xfrm>
+      </p:grpSpPr>
+      <p:sp>
+        <p:nvSpPr>
           <p:cNvPr id="9221" name="Slide Number Placeholder 3"/>
           <p:cNvSpPr>
             <a:spLocks noGrp="1"/>
@@ -11195,7 +11483,7 @@
             <a:fld id="{12CF27A8-2E27-47D3-89F5-30D5C89B3807}" type="slidenum">
               <a:rPr lang="en-US" sz="1200" smtClean="0"/>
               <a:pPr/>
-              <a:t>15</a:t>
+              <a:t>16</a:t>
             </a:fld>
             <a:endParaRPr lang="en-US" sz="1200" dirty="0" smtClean="0"/>
           </a:p>
@@ -11383,7 +11671,7 @@
           <a:graphicData uri="http://schemas.openxmlformats.org/presentationml/2006/ole">
             <mc:AlternateContent xmlns:mc="http://schemas.openxmlformats.org/markup-compatibility/2006">
               <mc:Choice xmlns:v="urn:schemas-microsoft-com:vml" Requires="v">
-                <p:oleObj spid="_x0000_s9476" name="Equation" r:id="rId4" imgW="1270000" imgH="457200" progId="Equation.DSMT4">
+                <p:oleObj spid="_x0000_s9489" name="Equation" r:id="rId4" imgW="1270000" imgH="457200" progId="Equation.DSMT4">
                   <p:embed/>
                 </p:oleObj>
               </mc:Choice>
@@ -11478,7 +11766,7 @@
           <a:graphicData uri="http://schemas.openxmlformats.org/presentationml/2006/ole">
             <mc:AlternateContent xmlns:mc="http://schemas.openxmlformats.org/markup-compatibility/2006">
               <mc:Choice xmlns:v="urn:schemas-microsoft-com:vml" Requires="v">
-                <p:oleObj spid="_x0000_s9477" name="Equation" r:id="rId6" imgW="1270000" imgH="457200" progId="Equation.DSMT4">
+                <p:oleObj spid="_x0000_s9490" name="Equation" r:id="rId6" imgW="1270000" imgH="457200" progId="Equation.DSMT4">
                   <p:embed/>
                 </p:oleObj>
               </mc:Choice>
@@ -11645,7 +11933,7 @@
           <a:graphicData uri="http://schemas.openxmlformats.org/presentationml/2006/ole">
             <mc:AlternateContent xmlns:mc="http://schemas.openxmlformats.org/markup-compatibility/2006">
               <mc:Choice xmlns:v="urn:schemas-microsoft-com:vml" Requires="v">
-                <p:oleObj spid="_x0000_s9478" name="Equation" r:id="rId8" imgW="774360" imgH="203040" progId="Equation.DSMT4">
+                <p:oleObj spid="_x0000_s9491" name="Equation" r:id="rId8" imgW="774360" imgH="203040" progId="Equation.DSMT4">
                   <p:embed/>
                 </p:oleObj>
               </mc:Choice>
@@ -11963,7 +12251,7 @@
 </p:sld>
 </file>
 
-<file path=ppt/slides/slide16.xml><?xml version="1.0" encoding="utf-8"?>
+<file path=ppt/slides/slide17.xml><?xml version="1.0" encoding="utf-8"?>
 <p:sld xmlns:a="http://schemas.openxmlformats.org/drawingml/2006/main" xmlns:r="http://schemas.openxmlformats.org/officeDocument/2006/relationships" xmlns:p="http://schemas.openxmlformats.org/presentationml/2006/main">
   <p:cSld>
     <p:spTree>
@@ -12020,7 +12308,7 @@
             <a:fld id="{E92C81C8-F27D-4AE4-B619-67321854E34B}" type="slidenum">
               <a:rPr lang="en-US" sz="1200" smtClean="0"/>
               <a:pPr/>
-              <a:t>16</a:t>
+              <a:t>17</a:t>
             </a:fld>
             <a:endParaRPr lang="en-US" sz="1200" dirty="0" smtClean="0"/>
           </a:p>
@@ -12222,7 +12510,7 @@
             <a:graphicData uri="http://schemas.openxmlformats.org/presentationml/2006/ole">
               <mc:AlternateContent xmlns:mc="http://schemas.openxmlformats.org/markup-compatibility/2006">
                 <mc:Choice xmlns:v="urn:schemas-microsoft-com:vml" Requires="v">
-                  <p:oleObj spid="_x0000_s10421" name="Equation" r:id="rId4" imgW="774360" imgH="203040" progId="Equation.DSMT4">
+                  <p:oleObj spid="_x0000_s10430" name="Equation" r:id="rId4" imgW="774360" imgH="203040" progId="Equation.DSMT4">
                     <p:embed/>
                   </p:oleObj>
                 </mc:Choice>
@@ -12387,7 +12675,7 @@
             <a:graphicData uri="http://schemas.openxmlformats.org/presentationml/2006/ole">
               <mc:AlternateContent xmlns:mc="http://schemas.openxmlformats.org/markup-compatibility/2006">
                 <mc:Choice xmlns:v="urn:schemas-microsoft-com:vml" Requires="v">
-                  <p:oleObj spid="_x0000_s10422" name="Equation" r:id="rId6" imgW="736560" imgH="203040" progId="Equation.DSMT4">
+                  <p:oleObj spid="_x0000_s10431" name="Equation" r:id="rId6" imgW="736560" imgH="203040" progId="Equation.DSMT4">
                     <p:embed/>
                   </p:oleObj>
                 </mc:Choice>
@@ -12754,7 +13042,7 @@
 </p:sld>
 </file>
 
-<file path=ppt/slides/slide17.xml><?xml version="1.0" encoding="utf-8"?>
+<file path=ppt/slides/slide18.xml><?xml version="1.0" encoding="utf-8"?>
 <p:sld xmlns:a="http://schemas.openxmlformats.org/drawingml/2006/main" xmlns:r="http://schemas.openxmlformats.org/officeDocument/2006/relationships" xmlns:p="http://schemas.openxmlformats.org/presentationml/2006/main">
   <p:cSld>
     <p:spTree>
@@ -12811,7 +13099,7 @@
             <a:fld id="{6F847A86-0EF0-4A1A-87B4-C860551EA508}" type="slidenum">
               <a:rPr lang="en-US" sz="1200" smtClean="0"/>
               <a:pPr/>
-              <a:t>17</a:t>
+              <a:t>18</a:t>
             </a:fld>
             <a:endParaRPr lang="en-US" sz="1200" dirty="0" smtClean="0"/>
           </a:p>
@@ -13238,7 +13526,7 @@
           <a:graphicData uri="http://schemas.openxmlformats.org/presentationml/2006/ole">
             <mc:AlternateContent xmlns:mc="http://schemas.openxmlformats.org/markup-compatibility/2006">
               <mc:Choice xmlns:v="urn:schemas-microsoft-com:vml" Requires="v">
-                <p:oleObj spid="_x0000_s11447" name="Equation" r:id="rId4" imgW="114120" imgH="177480" progId="Equation.DSMT4">
+                <p:oleObj spid="_x0000_s11456" name="Equation" r:id="rId4" imgW="114120" imgH="177480" progId="Equation.DSMT4">
                   <p:embed/>
                 </p:oleObj>
               </mc:Choice>
@@ -13308,7 +13596,7 @@
           <a:graphicData uri="http://schemas.openxmlformats.org/presentationml/2006/ole">
             <mc:AlternateContent xmlns:mc="http://schemas.openxmlformats.org/markup-compatibility/2006">
               <mc:Choice xmlns:v="urn:schemas-microsoft-com:vml" Requires="v">
-                <p:oleObj spid="_x0000_s11448" name="Equation" r:id="rId6" imgW="114120" imgH="177480" progId="Equation.DSMT4">
+                <p:oleObj spid="_x0000_s11457" name="Equation" r:id="rId6" imgW="114120" imgH="177480" progId="Equation.DSMT4">
                   <p:embed/>
                 </p:oleObj>
               </mc:Choice>
@@ -13626,7 +13914,7 @@
 </p:sld>
 </file>
 
-<file path=ppt/slides/slide18.xml><?xml version="1.0" encoding="utf-8"?>
+<file path=ppt/slides/slide19.xml><?xml version="1.0" encoding="utf-8"?>
 <p:sld xmlns:a="http://schemas.openxmlformats.org/drawingml/2006/main" xmlns:r="http://schemas.openxmlformats.org/officeDocument/2006/relationships" xmlns:p="http://schemas.openxmlformats.org/presentationml/2006/main">
   <p:cSld>
     <p:spTree>
@@ -13683,7 +13971,7 @@
             <a:fld id="{D06E24C3-47EC-4B6B-B7C6-E5F18597FBA4}" type="slidenum">
               <a:rPr lang="en-US" sz="1200" smtClean="0"/>
               <a:pPr/>
-              <a:t>18</a:t>
+              <a:t>19</a:t>
             </a:fld>
             <a:endParaRPr lang="en-US" sz="1200" dirty="0" smtClean="0"/>
           </a:p>
@@ -14133,7 +14421,271 @@
 </p:sld>
 </file>
 
-<file path=ppt/slides/slide19.xml><?xml version="1.0" encoding="utf-8"?>
+<file path=ppt/slides/slide2.xml><?xml version="1.0" encoding="utf-8"?>
+<p:sld xmlns:a="http://schemas.openxmlformats.org/drawingml/2006/main" xmlns:r="http://schemas.openxmlformats.org/officeDocument/2006/relationships" xmlns:p="http://schemas.openxmlformats.org/presentationml/2006/main" show="0">
+  <p:cSld>
+    <p:spTree>
+      <p:nvGrpSpPr>
+        <p:cNvPr id="1" name=""/>
+        <p:cNvGrpSpPr/>
+        <p:nvPr/>
+      </p:nvGrpSpPr>
+      <p:grpSpPr>
+        <a:xfrm>
+          <a:off x="0" y="0"/>
+          <a:ext cx="0" cy="0"/>
+          <a:chOff x="0" y="0"/>
+          <a:chExt cx="0" cy="0"/>
+        </a:xfrm>
+      </p:grpSpPr>
+      <p:sp>
+        <p:nvSpPr>
+          <p:cNvPr id="23554" name="Slide Number Placeholder 3"/>
+          <p:cNvSpPr>
+            <a:spLocks noGrp="1"/>
+          </p:cNvSpPr>
+          <p:nvPr>
+            <p:ph type="sldNum" sz="quarter" idx="10"/>
+          </p:nvPr>
+        </p:nvSpPr>
+        <p:spPr>
+          <a:xfrm>
+            <a:off x="7571335" y="6553200"/>
+            <a:ext cx="1572666" cy="307777"/>
+          </a:xfrm>
+          <a:noFill/>
+        </p:spPr>
+        <p:txBody>
+          <a:bodyPr/>
+          <a:lstStyle/>
+          <a:p>
+            <a:r>
+              <a:rPr lang="en-US" dirty="0" smtClean="0"/>
+              <a:t>      </a:t>
+            </a:r>
+            <a:r>
+              <a:rPr lang="en-US" sz="1200" dirty="0" smtClean="0"/>
+              <a:t>proof-</a:t>
+            </a:r>
+            <a:r>
+              <a:rPr lang="en-US" sz="1200" dirty="0" err="1" smtClean="0"/>
+              <a:t>intro.I</a:t>
+            </a:r>
+            <a:r>
+              <a:rPr lang="en-US" sz="1200" dirty="0" smtClean="0"/>
+              <a:t>.</a:t>
+            </a:r>
+            <a:fld id="{CBD4ADD5-DF96-4ED8-A1CB-551C52AF6B69}" type="slidenum">
+              <a:rPr lang="en-US" sz="1200" smtClean="0"/>
+              <a:pPr/>
+              <a:t>2</a:t>
+            </a:fld>
+            <a:endParaRPr lang="en-US" sz="1200" dirty="0" smtClean="0"/>
+          </a:p>
+        </p:txBody>
+      </p:sp>
+      <p:sp>
+        <p:nvSpPr>
+          <p:cNvPr id="23555" name="Rectangle 2"/>
+          <p:cNvSpPr>
+            <a:spLocks noGrp="1" noChangeArrowheads="1"/>
+          </p:cNvSpPr>
+          <p:nvPr>
+            <p:ph type="title"/>
+          </p:nvPr>
+        </p:nvSpPr>
+        <p:spPr>
+          <a:xfrm>
+            <a:off x="2436813" y="304800"/>
+            <a:ext cx="4270375" cy="1128713"/>
+          </a:xfrm>
+        </p:spPr>
+        <p:txBody>
+          <a:bodyPr/>
+          <a:lstStyle/>
+          <a:p>
+            <a:pPr eaLnBrk="1" hangingPunct="1"/>
+            <a:r>
+              <a:rPr lang="en-US" smtClean="0"/>
+              <a:t>Vocabulary</a:t>
+            </a:r>
+          </a:p>
+        </p:txBody>
+      </p:sp>
+      <p:sp>
+        <p:nvSpPr>
+          <p:cNvPr id="122883" name="Rectangle 3"/>
+          <p:cNvSpPr>
+            <a:spLocks noGrp="1" noChangeArrowheads="1"/>
+          </p:cNvSpPr>
+          <p:nvPr>
+            <p:ph type="body" idx="1"/>
+          </p:nvPr>
+        </p:nvSpPr>
+        <p:spPr>
+          <a:xfrm>
+            <a:off x="293688" y="1906588"/>
+            <a:ext cx="8591550" cy="2801937"/>
+          </a:xfrm>
+        </p:spPr>
+        <p:txBody>
+          <a:bodyPr/>
+          <a:lstStyle/>
+          <a:p>
+            <a:pPr eaLnBrk="1" hangingPunct="1">
+              <a:buFontTx/>
+              <a:buNone/>
+            </a:pPr>
+            <a:r>
+              <a:rPr lang="en-US" sz="4400" dirty="0" smtClean="0">
+                <a:solidFill>
+                  <a:srgbClr val="0D05A7"/>
+                </a:solidFill>
+              </a:rPr>
+              <a:t>Quickie:</a:t>
+            </a:r>
+          </a:p>
+          <a:p>
+            <a:pPr eaLnBrk="1" hangingPunct="1">
+              <a:buFontTx/>
+              <a:buNone/>
+            </a:pPr>
+            <a:r>
+              <a:rPr lang="en-US" sz="4800" dirty="0" smtClean="0"/>
+              <a:t>What does “discrete” mean?</a:t>
+            </a:r>
+          </a:p>
+          <a:p>
+            <a:pPr eaLnBrk="1" hangingPunct="1">
+              <a:buFontTx/>
+              <a:buNone/>
+            </a:pPr>
+            <a:r>
+              <a:rPr lang="en-US" sz="4800" dirty="0" smtClean="0">
+                <a:sym typeface="Symbol" pitchFamily="18" charset="2"/>
+              </a:rPr>
+              <a:t>                   ( </a:t>
+            </a:r>
+            <a:r>
+              <a:rPr lang="en-US" sz="4800" b="1" dirty="0" smtClean="0">
+                <a:solidFill>
+                  <a:srgbClr val="FF0000"/>
+                </a:solidFill>
+                <a:latin typeface="Euclid Symbol"/>
+                <a:sym typeface="Symbol" pitchFamily="18" charset="2"/>
+              </a:rPr>
+              <a:t>≠</a:t>
+            </a:r>
+            <a:r>
+              <a:rPr lang="en-US" sz="4800" dirty="0" smtClean="0">
+                <a:solidFill>
+                  <a:srgbClr val="FF0000"/>
+                </a:solidFill>
+                <a:latin typeface="Euclid Symbol"/>
+                <a:sym typeface="Symbol" pitchFamily="18" charset="2"/>
+              </a:rPr>
+              <a:t> </a:t>
+            </a:r>
+            <a:r>
+              <a:rPr lang="en-US" sz="4800" dirty="0" smtClean="0">
+                <a:sym typeface="Symbol" pitchFamily="18" charset="2"/>
+              </a:rPr>
+              <a:t>“discreet”)</a:t>
+            </a:r>
+          </a:p>
+        </p:txBody>
+      </p:sp>
+    </p:spTree>
+  </p:cSld>
+  <p:clrMapOvr>
+    <a:masterClrMapping/>
+  </p:clrMapOvr>
+  <p:transition xmlns:p14="http://schemas.microsoft.com/office/powerpoint/2010/main" spd="slow">
+    <p:fade/>
+  </p:transition>
+  <p:timing>
+    <p:tnLst>
+      <p:par>
+        <p:cTn xmlns:p14="http://schemas.microsoft.com/office/powerpoint/2010/main" id="1" dur="indefinite" restart="never" nodeType="tmRoot">
+          <p:childTnLst>
+            <p:seq concurrent="1" nextAc="seek">
+              <p:cTn id="2" dur="indefinite" nodeType="mainSeq">
+                <p:childTnLst>
+                  <p:par>
+                    <p:cTn id="3" fill="hold">
+                      <p:stCondLst>
+                        <p:cond delay="indefinite"/>
+                      </p:stCondLst>
+                      <p:childTnLst>
+                        <p:par>
+                          <p:cTn id="4" fill="hold">
+                            <p:stCondLst>
+                              <p:cond delay="0"/>
+                            </p:stCondLst>
+                            <p:childTnLst>
+                              <p:par>
+                                <p:cTn id="5" presetID="1" presetClass="entr" presetSubtype="0" fill="hold" nodeType="clickEffect">
+                                  <p:stCondLst>
+                                    <p:cond delay="0"/>
+                                  </p:stCondLst>
+                                  <p:childTnLst>
+                                    <p:set>
+                                      <p:cBhvr>
+                                        <p:cTn id="6" dur="1" fill="hold">
+                                          <p:stCondLst>
+                                            <p:cond delay="0"/>
+                                          </p:stCondLst>
+                                        </p:cTn>
+                                        <p:tgtEl>
+                                          <p:spTgt spid="122883">
+                                            <p:txEl>
+                                              <p:pRg st="2" end="2"/>
+                                            </p:txEl>
+                                          </p:spTgt>
+                                        </p:tgtEl>
+                                        <p:attrNameLst>
+                                          <p:attrName>style.visibility</p:attrName>
+                                        </p:attrNameLst>
+                                      </p:cBhvr>
+                                      <p:to>
+                                        <p:strVal val="visible"/>
+                                      </p:to>
+                                    </p:set>
+                                  </p:childTnLst>
+                                </p:cTn>
+                              </p:par>
+                            </p:childTnLst>
+                          </p:cTn>
+                        </p:par>
+                      </p:childTnLst>
+                    </p:cTn>
+                  </p:par>
+                </p:childTnLst>
+              </p:cTn>
+              <p:prevCondLst>
+                <p:cond evt="onPrev" delay="0">
+                  <p:tgtEl>
+                    <p:sldTgt/>
+                  </p:tgtEl>
+                </p:cond>
+              </p:prevCondLst>
+              <p:nextCondLst>
+                <p:cond evt="onNext" delay="0">
+                  <p:tgtEl>
+                    <p:sldTgt/>
+                  </p:tgtEl>
+                </p:cond>
+              </p:nextCondLst>
+            </p:seq>
+          </p:childTnLst>
+        </p:cTn>
+      </p:par>
+    </p:tnLst>
+  </p:timing>
+</p:sld>
+</file>
+
+<file path=ppt/slides/slide20.xml><?xml version="1.0" encoding="utf-8"?>
 <p:sld xmlns:a="http://schemas.openxmlformats.org/drawingml/2006/main" xmlns:r="http://schemas.openxmlformats.org/officeDocument/2006/relationships" xmlns:p="http://schemas.openxmlformats.org/presentationml/2006/main">
   <p:cSld>
     <p:spTree>
@@ -14190,7 +14742,7 @@
             <a:fld id="{38814692-9BDD-4F2D-A9DA-07816390A204}" type="slidenum">
               <a:rPr lang="en-US" sz="1200" smtClean="0"/>
               <a:pPr/>
-              <a:t>19</a:t>
+              <a:t>20</a:t>
             </a:fld>
             <a:endParaRPr lang="en-US" sz="1200" dirty="0" smtClean="0"/>
           </a:p>
@@ -14260,7 +14812,7 @@
           <a:graphicData uri="http://schemas.openxmlformats.org/presentationml/2006/ole">
             <mc:AlternateContent xmlns:mc="http://schemas.openxmlformats.org/markup-compatibility/2006">
               <mc:Choice xmlns:v="urn:schemas-microsoft-com:vml" Requires="v">
-                <p:oleObj spid="_x0000_s184426" name="Equation" r:id="rId4" imgW="2552700" imgH="419100" progId="Equation.DSMT4">
+                <p:oleObj spid="_x0000_s184431" name="Equation" r:id="rId4" imgW="2552700" imgH="419100" progId="Equation.DSMT4">
                   <p:embed/>
                 </p:oleObj>
               </mc:Choice>
@@ -14788,7 +15340,7 @@
 </p:sld>
 </file>
 
-<file path=ppt/slides/slide2.xml><?xml version="1.0" encoding="utf-8"?>
+<file path=ppt/slides/slide21.xml><?xml version="1.0" encoding="utf-8"?>
 <p:sld xmlns:a="http://schemas.openxmlformats.org/drawingml/2006/main" xmlns:r="http://schemas.openxmlformats.org/officeDocument/2006/relationships" xmlns:p="http://schemas.openxmlformats.org/presentationml/2006/main" show="0">
   <p:cSld>
     <p:spTree>
@@ -14807,270 +15359,6 @@
       </p:grpSpPr>
       <p:sp>
         <p:nvSpPr>
-          <p:cNvPr id="23554" name="Slide Number Placeholder 3"/>
-          <p:cNvSpPr>
-            <a:spLocks noGrp="1"/>
-          </p:cNvSpPr>
-          <p:nvPr>
-            <p:ph type="sldNum" sz="quarter" idx="10"/>
-          </p:nvPr>
-        </p:nvSpPr>
-        <p:spPr>
-          <a:xfrm>
-            <a:off x="7571335" y="6553200"/>
-            <a:ext cx="1572666" cy="307777"/>
-          </a:xfrm>
-          <a:noFill/>
-        </p:spPr>
-        <p:txBody>
-          <a:bodyPr/>
-          <a:lstStyle/>
-          <a:p>
-            <a:r>
-              <a:rPr lang="en-US" dirty="0" smtClean="0"/>
-              <a:t>      </a:t>
-            </a:r>
-            <a:r>
-              <a:rPr lang="en-US" sz="1200" dirty="0" smtClean="0"/>
-              <a:t>proof-</a:t>
-            </a:r>
-            <a:r>
-              <a:rPr lang="en-US" sz="1200" dirty="0" err="1" smtClean="0"/>
-              <a:t>intro.I</a:t>
-            </a:r>
-            <a:r>
-              <a:rPr lang="en-US" sz="1200" dirty="0" smtClean="0"/>
-              <a:t>.</a:t>
-            </a:r>
-            <a:fld id="{CBD4ADD5-DF96-4ED8-A1CB-551C52AF6B69}" type="slidenum">
-              <a:rPr lang="en-US" sz="1200" smtClean="0"/>
-              <a:pPr/>
-              <a:t>2</a:t>
-            </a:fld>
-            <a:endParaRPr lang="en-US" sz="1200" dirty="0" smtClean="0"/>
-          </a:p>
-        </p:txBody>
-      </p:sp>
-      <p:sp>
-        <p:nvSpPr>
-          <p:cNvPr id="23555" name="Rectangle 2"/>
-          <p:cNvSpPr>
-            <a:spLocks noGrp="1" noChangeArrowheads="1"/>
-          </p:cNvSpPr>
-          <p:nvPr>
-            <p:ph type="title"/>
-          </p:nvPr>
-        </p:nvSpPr>
-        <p:spPr>
-          <a:xfrm>
-            <a:off x="2436813" y="304800"/>
-            <a:ext cx="4270375" cy="1128713"/>
-          </a:xfrm>
-        </p:spPr>
-        <p:txBody>
-          <a:bodyPr/>
-          <a:lstStyle/>
-          <a:p>
-            <a:pPr eaLnBrk="1" hangingPunct="1"/>
-            <a:r>
-              <a:rPr lang="en-US" smtClean="0"/>
-              <a:t>Vocabulary</a:t>
-            </a:r>
-          </a:p>
-        </p:txBody>
-      </p:sp>
-      <p:sp>
-        <p:nvSpPr>
-          <p:cNvPr id="122883" name="Rectangle 3"/>
-          <p:cNvSpPr>
-            <a:spLocks noGrp="1" noChangeArrowheads="1"/>
-          </p:cNvSpPr>
-          <p:nvPr>
-            <p:ph type="body" idx="1"/>
-          </p:nvPr>
-        </p:nvSpPr>
-        <p:spPr>
-          <a:xfrm>
-            <a:off x="293688" y="1906588"/>
-            <a:ext cx="8591550" cy="2801937"/>
-          </a:xfrm>
-        </p:spPr>
-        <p:txBody>
-          <a:bodyPr/>
-          <a:lstStyle/>
-          <a:p>
-            <a:pPr eaLnBrk="1" hangingPunct="1">
-              <a:buFontTx/>
-              <a:buNone/>
-            </a:pPr>
-            <a:r>
-              <a:rPr lang="en-US" sz="4400" dirty="0" smtClean="0">
-                <a:solidFill>
-                  <a:srgbClr val="0D05A7"/>
-                </a:solidFill>
-              </a:rPr>
-              <a:t>Quickie:</a:t>
-            </a:r>
-          </a:p>
-          <a:p>
-            <a:pPr eaLnBrk="1" hangingPunct="1">
-              <a:buFontTx/>
-              <a:buNone/>
-            </a:pPr>
-            <a:r>
-              <a:rPr lang="en-US" sz="4800" dirty="0" smtClean="0"/>
-              <a:t>What does “discrete” mean?</a:t>
-            </a:r>
-          </a:p>
-          <a:p>
-            <a:pPr eaLnBrk="1" hangingPunct="1">
-              <a:buFontTx/>
-              <a:buNone/>
-            </a:pPr>
-            <a:r>
-              <a:rPr lang="en-US" sz="4800" dirty="0" smtClean="0">
-                <a:sym typeface="Symbol" pitchFamily="18" charset="2"/>
-              </a:rPr>
-              <a:t>                   ( </a:t>
-            </a:r>
-            <a:r>
-              <a:rPr lang="en-US" sz="4800" b="1" dirty="0" smtClean="0">
-                <a:solidFill>
-                  <a:srgbClr val="FF0000"/>
-                </a:solidFill>
-                <a:latin typeface="Euclid Symbol"/>
-                <a:sym typeface="Symbol" pitchFamily="18" charset="2"/>
-              </a:rPr>
-              <a:t>≠</a:t>
-            </a:r>
-            <a:r>
-              <a:rPr lang="en-US" sz="4800" dirty="0" smtClean="0">
-                <a:solidFill>
-                  <a:srgbClr val="FF0000"/>
-                </a:solidFill>
-                <a:latin typeface="Euclid Symbol"/>
-                <a:sym typeface="Symbol" pitchFamily="18" charset="2"/>
-              </a:rPr>
-              <a:t> </a:t>
-            </a:r>
-            <a:r>
-              <a:rPr lang="en-US" sz="4800" dirty="0" smtClean="0">
-                <a:sym typeface="Symbol" pitchFamily="18" charset="2"/>
-              </a:rPr>
-              <a:t>“discreet”)</a:t>
-            </a:r>
-          </a:p>
-        </p:txBody>
-      </p:sp>
-    </p:spTree>
-  </p:cSld>
-  <p:clrMapOvr>
-    <a:masterClrMapping/>
-  </p:clrMapOvr>
-  <p:transition xmlns:p14="http://schemas.microsoft.com/office/powerpoint/2010/main" spd="slow">
-    <p:fade/>
-  </p:transition>
-  <p:timing>
-    <p:tnLst>
-      <p:par>
-        <p:cTn xmlns:p14="http://schemas.microsoft.com/office/powerpoint/2010/main" id="1" dur="indefinite" restart="never" nodeType="tmRoot">
-          <p:childTnLst>
-            <p:seq concurrent="1" nextAc="seek">
-              <p:cTn id="2" dur="indefinite" nodeType="mainSeq">
-                <p:childTnLst>
-                  <p:par>
-                    <p:cTn id="3" fill="hold">
-                      <p:stCondLst>
-                        <p:cond delay="indefinite"/>
-                      </p:stCondLst>
-                      <p:childTnLst>
-                        <p:par>
-                          <p:cTn id="4" fill="hold">
-                            <p:stCondLst>
-                              <p:cond delay="0"/>
-                            </p:stCondLst>
-                            <p:childTnLst>
-                              <p:par>
-                                <p:cTn id="5" presetID="1" presetClass="entr" presetSubtype="0" fill="hold" nodeType="clickEffect">
-                                  <p:stCondLst>
-                                    <p:cond delay="0"/>
-                                  </p:stCondLst>
-                                  <p:childTnLst>
-                                    <p:set>
-                                      <p:cBhvr>
-                                        <p:cTn id="6" dur="1" fill="hold">
-                                          <p:stCondLst>
-                                            <p:cond delay="0"/>
-                                          </p:stCondLst>
-                                        </p:cTn>
-                                        <p:tgtEl>
-                                          <p:spTgt spid="122883">
-                                            <p:txEl>
-                                              <p:pRg st="2" end="2"/>
-                                            </p:txEl>
-                                          </p:spTgt>
-                                        </p:tgtEl>
-                                        <p:attrNameLst>
-                                          <p:attrName>style.visibility</p:attrName>
-                                        </p:attrNameLst>
-                                      </p:cBhvr>
-                                      <p:to>
-                                        <p:strVal val="visible"/>
-                                      </p:to>
-                                    </p:set>
-                                  </p:childTnLst>
-                                </p:cTn>
-                              </p:par>
-                            </p:childTnLst>
-                          </p:cTn>
-                        </p:par>
-                      </p:childTnLst>
-                    </p:cTn>
-                  </p:par>
-                </p:childTnLst>
-              </p:cTn>
-              <p:prevCondLst>
-                <p:cond evt="onPrev" delay="0">
-                  <p:tgtEl>
-                    <p:sldTgt/>
-                  </p:tgtEl>
-                </p:cond>
-              </p:prevCondLst>
-              <p:nextCondLst>
-                <p:cond evt="onNext" delay="0">
-                  <p:tgtEl>
-                    <p:sldTgt/>
-                  </p:tgtEl>
-                </p:cond>
-              </p:nextCondLst>
-            </p:seq>
-          </p:childTnLst>
-        </p:cTn>
-      </p:par>
-    </p:tnLst>
-  </p:timing>
-</p:sld>
-</file>
-
-<file path=ppt/slides/slide20.xml><?xml version="1.0" encoding="utf-8"?>
-<p:sld xmlns:a="http://schemas.openxmlformats.org/drawingml/2006/main" xmlns:r="http://schemas.openxmlformats.org/officeDocument/2006/relationships" xmlns:p="http://schemas.openxmlformats.org/presentationml/2006/main" show="0">
-  <p:cSld>
-    <p:spTree>
-      <p:nvGrpSpPr>
-        <p:cNvPr id="1" name=""/>
-        <p:cNvGrpSpPr/>
-        <p:nvPr/>
-      </p:nvGrpSpPr>
-      <p:grpSpPr>
-        <a:xfrm>
-          <a:off x="0" y="0"/>
-          <a:ext cx="0" cy="0"/>
-          <a:chOff x="0" y="0"/>
-          <a:chExt cx="0" cy="0"/>
-        </a:xfrm>
-      </p:grpSpPr>
-      <p:sp>
-        <p:nvSpPr>
           <p:cNvPr id="12291" name="Slide Number Placeholder 2"/>
           <p:cNvSpPr>
             <a:spLocks noGrp="1"/>
@@ -15109,7 +15397,7 @@
             <a:fld id="{38814692-9BDD-4F2D-A9DA-07816390A204}" type="slidenum">
               <a:rPr lang="en-US" sz="1200" smtClean="0"/>
               <a:pPr/>
-              <a:t>20</a:t>
+              <a:t>21</a:t>
             </a:fld>
             <a:endParaRPr lang="en-US" sz="1200" dirty="0" smtClean="0"/>
           </a:p>
@@ -15198,7 +15486,7 @@
           <a:graphicData uri="http://schemas.openxmlformats.org/presentationml/2006/ole">
             <mc:AlternateContent xmlns:mc="http://schemas.openxmlformats.org/markup-compatibility/2006">
               <mc:Choice xmlns:v="urn:schemas-microsoft-com:vml" Requires="v">
-                <p:oleObj spid="_x0000_s12394" name="Equation" r:id="rId4" imgW="2590560" imgH="368280" progId="Equation.DSMT4">
+                <p:oleObj spid="_x0000_s12399" name="Equation" r:id="rId4" imgW="2590560" imgH="368280" progId="Equation.DSMT4">
                   <p:embed/>
                 </p:oleObj>
               </mc:Choice>
@@ -15668,7 +15956,7 @@
 </p:sld>
 </file>
 
-<file path=ppt/slides/slide21.xml><?xml version="1.0" encoding="utf-8"?>
+<file path=ppt/slides/slide22.xml><?xml version="1.0" encoding="utf-8"?>
 <p:sld xmlns:a="http://schemas.openxmlformats.org/drawingml/2006/main" xmlns:r="http://schemas.openxmlformats.org/officeDocument/2006/relationships" xmlns:p="http://schemas.openxmlformats.org/presentationml/2006/main">
   <p:cSld>
     <p:spTree>
@@ -15721,7 +16009,7 @@
             <a:fld id="{149CEC67-A6D5-4032-8245-198398361EE0}" type="slidenum">
               <a:rPr lang="en-US" sz="1200" smtClean="0"/>
               <a:pPr/>
-              <a:t>21</a:t>
+              <a:t>22</a:t>
             </a:fld>
             <a:endParaRPr lang="en-US" sz="1200" dirty="0" smtClean="0"/>
           </a:p>
@@ -16097,7 +16385,7 @@
           <a:graphicData uri="http://schemas.openxmlformats.org/presentationml/2006/ole">
             <mc:AlternateContent xmlns:mc="http://schemas.openxmlformats.org/markup-compatibility/2006">
               <mc:Choice xmlns:v="urn:schemas-microsoft-com:vml" Requires="v">
-                <p:oleObj spid="_x0000_s13418" name="Equation" r:id="rId4" imgW="152280" imgH="393480" progId="Equation.DSMT4">
+                <p:oleObj spid="_x0000_s13423" name="Equation" r:id="rId4" imgW="152280" imgH="393480" progId="Equation.DSMT4">
                   <p:embed/>
                 </p:oleObj>
               </mc:Choice>
@@ -16415,7 +16703,7 @@
 </p:sld>
 </file>
 
-<file path=ppt/slides/slide22.xml><?xml version="1.0" encoding="utf-8"?>
+<file path=ppt/slides/slide23.xml><?xml version="1.0" encoding="utf-8"?>
 <p:sld xmlns:a="http://schemas.openxmlformats.org/drawingml/2006/main" xmlns:r="http://schemas.openxmlformats.org/officeDocument/2006/relationships" xmlns:p="http://schemas.openxmlformats.org/presentationml/2006/main">
   <p:cSld>
     <p:spTree>
@@ -16468,7 +16756,7 @@
             <a:fld id="{17F4D99F-8DB9-47AB-B21C-80A9F5EE51B9}" type="slidenum">
               <a:rPr lang="en-US" sz="1200" smtClean="0"/>
               <a:pPr/>
-              <a:t>22</a:t>
+              <a:t>23</a:t>
             </a:fld>
             <a:endParaRPr lang="en-US" sz="1200" dirty="0" smtClean="0"/>
           </a:p>
@@ -17232,7 +17520,7 @@
           <a:graphicData uri="http://schemas.openxmlformats.org/presentationml/2006/ole">
             <mc:AlternateContent xmlns:mc="http://schemas.openxmlformats.org/markup-compatibility/2006">
               <mc:Choice xmlns:v="urn:schemas-microsoft-com:vml" Requires="v">
-                <p:oleObj spid="_x0000_s150634" name="Equation" r:id="rId4" imgW="838200" imgH="241300" progId="Equation.DSMT4">
+                <p:oleObj spid="_x0000_s150639" name="Equation" r:id="rId4" imgW="838200" imgH="241300" progId="Equation.DSMT4">
                   <p:embed/>
                 </p:oleObj>
               </mc:Choice>
@@ -17901,7 +18189,7 @@
           <a:graphicData uri="http://schemas.openxmlformats.org/presentationml/2006/ole">
             <mc:AlternateContent xmlns:mc="http://schemas.openxmlformats.org/markup-compatibility/2006">
               <mc:Choice xmlns:v="urn:schemas-microsoft-com:vml" Requires="v">
-                <p:oleObj spid="_x0000_s6329" name="Equation" r:id="rId4" imgW="304560" imgH="139680" progId="Equation.DSMT4">
+                <p:oleObj spid="_x0000_s6338" name="Equation" r:id="rId4" imgW="304560" imgH="139680" progId="Equation.DSMT4">
                   <p:embed/>
                 </p:oleObj>
               </mc:Choice>
@@ -17971,7 +18259,7 @@
           <a:graphicData uri="http://schemas.openxmlformats.org/presentationml/2006/ole">
             <mc:AlternateContent xmlns:mc="http://schemas.openxmlformats.org/markup-compatibility/2006">
               <mc:Choice xmlns:v="urn:schemas-microsoft-com:vml" Requires="v">
-                <p:oleObj spid="_x0000_s6330" name="Equation" r:id="rId6" imgW="304560" imgH="139680" progId="Equation.DSMT4">
+                <p:oleObj spid="_x0000_s6339" name="Equation" r:id="rId6" imgW="304560" imgH="139680" progId="Equation.DSMT4">
                   <p:embed/>
                 </p:oleObj>
               </mc:Choice>
@@ -19879,7 +20167,7 @@
           <a:graphicData uri="http://schemas.openxmlformats.org/presentationml/2006/ole">
             <mc:AlternateContent xmlns:mc="http://schemas.openxmlformats.org/markup-compatibility/2006">
               <mc:Choice xmlns:v="urn:schemas-microsoft-com:vml" Requires="v">
-                <p:oleObj spid="_x0000_s7347" name="Equation" r:id="rId4" imgW="304560" imgH="139680" progId="Equation.DSMT4">
+                <p:oleObj spid="_x0000_s7356" name="Equation" r:id="rId4" imgW="304560" imgH="139680" progId="Equation.DSMT4">
                   <p:embed/>
                 </p:oleObj>
               </mc:Choice>
@@ -19949,7 +20237,7 @@
           <a:graphicData uri="http://schemas.openxmlformats.org/presentationml/2006/ole">
             <mc:AlternateContent xmlns:mc="http://schemas.openxmlformats.org/markup-compatibility/2006">
               <mc:Choice xmlns:v="urn:schemas-microsoft-com:vml" Requires="v">
-                <p:oleObj spid="_x0000_s7348" name="Equation" r:id="rId6" imgW="304560" imgH="139680" progId="Equation.DSMT4">
+                <p:oleObj spid="_x0000_s7357" name="Equation" r:id="rId6" imgW="304560" imgH="139680" progId="Equation.DSMT4">
                   <p:embed/>
                 </p:oleObj>
               </mc:Choice>
@@ -20358,7 +20646,7 @@
           <a:graphicData uri="http://schemas.openxmlformats.org/presentationml/2006/ole">
             <mc:AlternateContent xmlns:mc="http://schemas.openxmlformats.org/markup-compatibility/2006">
               <mc:Choice xmlns:v="urn:schemas-microsoft-com:vml" Requires="v">
-                <p:oleObj spid="_x0000_s210044" name="Equation" r:id="rId4" imgW="114120" imgH="177480" progId="Equation.DSMT4">
+                <p:oleObj spid="_x0000_s210053" name="Equation" r:id="rId4" imgW="114120" imgH="177480" progId="Equation.DSMT4">
                   <p:embed/>
                 </p:oleObj>
               </mc:Choice>
@@ -20963,7 +21251,7 @@
           <a:graphicData uri="http://schemas.openxmlformats.org/presentationml/2006/ole">
             <mc:AlternateContent xmlns:mc="http://schemas.openxmlformats.org/markup-compatibility/2006">
               <mc:Choice xmlns:v="urn:schemas-microsoft-com:vml" Requires="v">
-                <p:oleObj spid="_x0000_s210045" name="Equation" r:id="rId6" imgW="635000" imgH="469900" progId="Equation.DSMT4">
+                <p:oleObj spid="_x0000_s210054" name="Equation" r:id="rId6" imgW="635000" imgH="469900" progId="Equation.DSMT4">
                   <p:embed/>
                 </p:oleObj>
               </mc:Choice>
@@ -21199,7 +21487,7 @@
           <a:graphicData uri="http://schemas.openxmlformats.org/presentationml/2006/ole">
             <mc:AlternateContent xmlns:mc="http://schemas.openxmlformats.org/markup-compatibility/2006">
               <mc:Choice xmlns:v="urn:schemas-microsoft-com:vml" Requires="v">
-                <p:oleObj spid="_x0000_s187549" name="Equation" r:id="rId4" imgW="114120" imgH="177480" progId="Equation.DSMT4">
+                <p:oleObj spid="_x0000_s187558" name="Equation" r:id="rId4" imgW="114120" imgH="177480" progId="Equation.DSMT4">
                   <p:embed/>
                 </p:oleObj>
               </mc:Choice>
@@ -21857,7 +22145,7 @@
             <a:graphicData uri="http://schemas.openxmlformats.org/presentationml/2006/ole">
               <mc:AlternateContent xmlns:mc="http://schemas.openxmlformats.org/markup-compatibility/2006">
                 <mc:Choice xmlns:v="urn:schemas-microsoft-com:vml" Requires="v">
-                  <p:oleObj spid="_x0000_s187550" name="Equation" r:id="rId6" imgW="635000" imgH="444500" progId="Equation.DSMT4">
+                  <p:oleObj spid="_x0000_s187559" name="Equation" r:id="rId6" imgW="635000" imgH="444500" progId="Equation.DSMT4">
                     <p:embed/>
                   </p:oleObj>
                 </mc:Choice>
@@ -22018,7 +22306,7 @@
           <a:graphicData uri="http://schemas.openxmlformats.org/presentationml/2006/ole">
             <mc:AlternateContent xmlns:mc="http://schemas.openxmlformats.org/markup-compatibility/2006">
               <mc:Choice xmlns:v="urn:schemas-microsoft-com:vml" Requires="v">
-                <p:oleObj spid="_x0000_s219162" name="Equation" r:id="rId4" imgW="114120" imgH="177480" progId="Equation.DSMT4">
+                <p:oleObj spid="_x0000_s219171" name="Equation" r:id="rId4" imgW="114120" imgH="177480" progId="Equation.DSMT4">
                   <p:embed/>
                 </p:oleObj>
               </mc:Choice>
@@ -22697,7 +22985,7 @@
           <a:graphicData uri="http://schemas.openxmlformats.org/presentationml/2006/ole">
             <mc:AlternateContent xmlns:mc="http://schemas.openxmlformats.org/markup-compatibility/2006">
               <mc:Choice xmlns:v="urn:schemas-microsoft-com:vml" Requires="v">
-                <p:oleObj spid="_x0000_s219163" name="Equation" r:id="rId6" imgW="635000" imgH="444500" progId="Equation.DSMT4">
+                <p:oleObj spid="_x0000_s219172" name="Equation" r:id="rId6" imgW="635000" imgH="444500" progId="Equation.DSMT4">
                   <p:embed/>
                 </p:oleObj>
               </mc:Choice>

</xml_diff>

<commit_message>
rename MQ_handshake_average to TP_, edit soln TP_preserved_under_isomorphism, tweak proofs1.pptx
</commit_message>
<xml_diff>
--- a/fall15/slidesF15/proofs1.pptx
+++ b/fall15/slidesF15/proofs1.pptx
@@ -5730,7 +5730,7 @@
           <a:graphicData uri="http://schemas.openxmlformats.org/presentationml/2006/ole">
             <mc:AlternateContent xmlns:mc="http://schemas.openxmlformats.org/markup-compatibility/2006">
               <mc:Choice xmlns:v="urn:schemas-microsoft-com:vml" Requires="v">
-                <p:oleObj spid="_x0000_s1233" name="Equation" r:id="rId4" imgW="914400" imgH="215640" progId="Equation.3">
+                <p:oleObj spid="_x0000_s1238" name="Equation" r:id="rId4" imgW="914400" imgH="215640" progId="Equation.3">
                   <p:embed/>
                 </p:oleObj>
               </mc:Choice>
@@ -5800,7 +5800,7 @@
           <a:graphicData uri="http://schemas.openxmlformats.org/presentationml/2006/ole">
             <mc:AlternateContent xmlns:mc="http://schemas.openxmlformats.org/markup-compatibility/2006">
               <mc:Choice xmlns:v="urn:schemas-microsoft-com:vml" Requires="v">
-                <p:oleObj spid="_x0000_s1234" name="Equation" r:id="rId6" imgW="914400" imgH="215640" progId="Equation.3">
+                <p:oleObj spid="_x0000_s1239" name="Equation" r:id="rId6" imgW="914400" imgH="215640" progId="Equation.3">
                   <p:embed/>
                 </p:oleObj>
               </mc:Choice>
@@ -5916,7 +5916,7 @@
           <a:graphicData uri="http://schemas.openxmlformats.org/presentationml/2006/ole">
             <mc:AlternateContent xmlns:mc="http://schemas.openxmlformats.org/markup-compatibility/2006">
               <mc:Choice xmlns:v="urn:schemas-microsoft-com:vml" Requires="v">
-                <p:oleObj spid="_x0000_s187578" name="Equation" r:id="rId4" imgW="635000" imgH="444500" progId="Equation.DSMT4">
+                <p:oleObj spid="_x0000_s187583" name="Equation" r:id="rId4" imgW="635000" imgH="444500" progId="Equation.DSMT4">
                   <p:embed/>
                 </p:oleObj>
               </mc:Choice>
@@ -6044,7 +6044,7 @@
           <a:graphicData uri="http://schemas.openxmlformats.org/presentationml/2006/ole">
             <mc:AlternateContent xmlns:mc="http://schemas.openxmlformats.org/markup-compatibility/2006">
               <mc:Choice xmlns:v="urn:schemas-microsoft-com:vml" Requires="v">
-                <p:oleObj spid="_x0000_s187579" name="Equation" r:id="rId6" imgW="114120" imgH="177480" progId="Equation.DSMT4">
+                <p:oleObj spid="_x0000_s187584" name="Equation" r:id="rId6" imgW="114120" imgH="177480" progId="Equation.DSMT4">
                   <p:embed/>
                 </p:oleObj>
               </mc:Choice>
@@ -6115,7 +6115,7 @@
             <a:avLst/>
           </a:prstGeom>
           <a:solidFill>
-            <a:srgbClr val="FF0000"/>
+            <a:srgbClr val="FF6168"/>
           </a:solidFill>
           <a:ln w="9525">
             <a:solidFill>
@@ -6153,7 +6153,7 @@
             <a:avLst/>
           </a:prstGeom>
           <a:solidFill>
-            <a:srgbClr val="FF0000"/>
+            <a:srgbClr val="FF6168"/>
           </a:solidFill>
           <a:ln w="9525">
             <a:solidFill>
@@ -6188,7 +6188,7 @@
             <a:chExt cx="2635250" cy="1503362"/>
           </a:xfrm>
           <a:solidFill>
-            <a:srgbClr val="FF0000"/>
+            <a:srgbClr val="FF6168"/>
           </a:solidFill>
         </p:grpSpPr>
         <p:sp>
@@ -6534,7 +6534,7 @@
             <a:avLst/>
           </a:prstGeom>
           <a:solidFill>
-            <a:srgbClr val="FF0000"/>
+            <a:srgbClr val="FF6168"/>
           </a:solidFill>
           <a:ln w="9525">
             <a:solidFill>
@@ -6686,14 +6686,14 @@
         </p:nvGrpSpPr>
         <p:grpSpPr>
           <a:xfrm>
-            <a:off x="2374904" y="1892300"/>
+            <a:off x="2362204" y="1905000"/>
             <a:ext cx="1605553" cy="1564648"/>
             <a:chOff x="2798444" y="1900210"/>
             <a:chExt cx="2656037" cy="1529469"/>
           </a:xfrm>
           <a:solidFill>
             <a:schemeClr val="accent1">
-              <a:lumMod val="50000"/>
+              <a:lumMod val="75000"/>
             </a:schemeClr>
           </a:solidFill>
         </p:grpSpPr>
@@ -6778,8 +6778,8 @@
         </p:nvSpPr>
         <p:spPr>
           <a:xfrm>
-            <a:off x="2659926" y="5384800"/>
-            <a:ext cx="3145212" cy="830997"/>
+            <a:off x="2551876" y="5168900"/>
+            <a:ext cx="3412112" cy="830997"/>
           </a:xfrm>
           <a:prstGeom prst="rect">
             <a:avLst/>
@@ -6812,7 +6812,7 @@
               <a:t>×</a:t>
             </a:r>
             <a:r>
-              <a:rPr lang="en-US" sz="4800" b="1" dirty="0" err="1">
+              <a:rPr lang="en-US" sz="4800" b="1" dirty="0" err="1" smtClean="0">
                 <a:solidFill>
                   <a:srgbClr val="0000F1"/>
                 </a:solidFill>
@@ -6822,13 +6822,14 @@
               <a:t>a</a:t>
             </a:r>
             <a:r>
-              <a:rPr lang="en-US" sz="4800" dirty="0">
+              <a:rPr lang="en-US" sz="4800" b="1" dirty="0" smtClean="0">
                 <a:solidFill>
-                  <a:srgbClr val="000000"/>
+                  <a:srgbClr val="0000F1"/>
                 </a:solidFill>
                 <a:latin typeface="Comic Sans MS" pitchFamily="66" charset="0"/>
+                <a:sym typeface="Symbol" pitchFamily="18" charset="2"/>
               </a:rPr>
-              <a:t> &amp; </a:t>
+              <a:t> </a:t>
             </a:r>
             <a:r>
               <a:rPr lang="en-US" sz="4800" dirty="0" smtClean="0">
@@ -6837,7 +6838,7 @@
                 </a:solidFill>
                 <a:latin typeface="Comic Sans MS" pitchFamily="66" charset="0"/>
               </a:rPr>
-              <a:t> </a:t>
+              <a:t> &amp;  </a:t>
             </a:r>
             <a:r>
               <a:rPr lang="en-US" sz="4800" b="1" dirty="0" err="1">
@@ -6891,24 +6892,106 @@
   <p:clrMapOvr>
     <a:masterClrMapping/>
   </p:clrMapOvr>
-  <mc:AlternateContent xmlns:mc="http://schemas.openxmlformats.org/markup-compatibility/2006" xmlns:p14="http://schemas.microsoft.com/office/powerpoint/2010/main">
-    <mc:Choice Requires="p14">
-      <p:transition spd="slow" p14:dur="1200" advClick="0">
-        <p:dissolve/>
+  <mc:AlternateContent xmlns:mc="http://schemas.openxmlformats.org/markup-compatibility/2006">
+    <mc:Choice xmlns:p14="http://schemas.microsoft.com/office/powerpoint/2010/main" Requires="p14">
+      <p:transition spd="med" p14:dur="700" advClick="0">
+        <p:fade/>
       </p:transition>
     </mc:Choice>
-    <mc:Fallback xmlns="">
-      <p:transition xmlns:p14="http://schemas.microsoft.com/office/powerpoint/2010/main" spd="slow" advClick="0">
-        <p:dissolve/>
+    <mc:Fallback>
+      <p:transition xmlns:p14="http://schemas.microsoft.com/office/powerpoint/2010/main" spd="med" advClick="0">
+        <p:fade/>
       </p:transition>
     </mc:Fallback>
   </mc:AlternateContent>
   <p:timing>
     <p:tnLst>
       <p:par>
-        <p:cTn xmlns:p14="http://schemas.microsoft.com/office/powerpoint/2010/main" id="1" dur="indefinite" restart="never" nodeType="tmRoot"/>
+        <p:cTn xmlns:p14="http://schemas.microsoft.com/office/powerpoint/2010/main" id="1" dur="indefinite" restart="never" nodeType="tmRoot">
+          <p:childTnLst>
+            <p:seq concurrent="1" nextAc="seek">
+              <p:cTn id="2" dur="indefinite" nodeType="mainSeq">
+                <p:childTnLst>
+                  <p:par>
+                    <p:cTn id="3" fill="hold">
+                      <p:stCondLst>
+                        <p:cond delay="indefinite"/>
+                        <p:cond evt="onBegin" delay="0">
+                          <p:tn val="2"/>
+                        </p:cond>
+                      </p:stCondLst>
+                      <p:childTnLst>
+                        <p:par>
+                          <p:cTn id="4" fill="hold">
+                            <p:stCondLst>
+                              <p:cond delay="0"/>
+                            </p:stCondLst>
+                            <p:childTnLst>
+                              <p:par>
+                                <p:cTn id="5" presetID="10" presetClass="entr" presetSubtype="0" fill="hold" grpId="0" nodeType="afterEffect">
+                                  <p:stCondLst>
+                                    <p:cond delay="500"/>
+                                  </p:stCondLst>
+                                  <p:childTnLst>
+                                    <p:set>
+                                      <p:cBhvr>
+                                        <p:cTn id="6" dur="1" fill="hold">
+                                          <p:stCondLst>
+                                            <p:cond delay="0"/>
+                                          </p:stCondLst>
+                                        </p:cTn>
+                                        <p:tgtEl>
+                                          <p:spTgt spid="4"/>
+                                        </p:tgtEl>
+                                        <p:attrNameLst>
+                                          <p:attrName>style.visibility</p:attrName>
+                                        </p:attrNameLst>
+                                      </p:cBhvr>
+                                      <p:to>
+                                        <p:strVal val="visible"/>
+                                      </p:to>
+                                    </p:set>
+                                    <p:animEffect transition="in" filter="fade">
+                                      <p:cBhvr>
+                                        <p:cTn id="7" dur="1000"/>
+                                        <p:tgtEl>
+                                          <p:spTgt spid="4"/>
+                                        </p:tgtEl>
+                                      </p:cBhvr>
+                                    </p:animEffect>
+                                  </p:childTnLst>
+                                </p:cTn>
+                              </p:par>
+                            </p:childTnLst>
+                          </p:cTn>
+                        </p:par>
+                      </p:childTnLst>
+                    </p:cTn>
+                  </p:par>
+                </p:childTnLst>
+              </p:cTn>
+              <p:prevCondLst>
+                <p:cond evt="onPrev" delay="0">
+                  <p:tgtEl>
+                    <p:sldTgt/>
+                  </p:tgtEl>
+                </p:cond>
+              </p:prevCondLst>
+              <p:nextCondLst>
+                <p:cond evt="onNext" delay="0">
+                  <p:tgtEl>
+                    <p:sldTgt/>
+                  </p:tgtEl>
+                </p:cond>
+              </p:nextCondLst>
+            </p:seq>
+          </p:childTnLst>
+        </p:cTn>
       </p:par>
     </p:tnLst>
+    <p:bldLst>
+      <p:bldP spid="4" grpId="0"/>
+    </p:bldLst>
   </p:timing>
 </p:sld>
 </file>
@@ -12787,7 +12870,7 @@
           <a:graphicData uri="http://schemas.openxmlformats.org/presentationml/2006/ole">
             <mc:AlternateContent xmlns:mc="http://schemas.openxmlformats.org/markup-compatibility/2006">
               <mc:Choice xmlns:v="urn:schemas-microsoft-com:vml" Requires="v">
-                <p:oleObj spid="_x0000_s9509" name="Equation" r:id="rId4" imgW="1270000" imgH="457200" progId="Equation.DSMT4">
+                <p:oleObj spid="_x0000_s9516" name="Equation" r:id="rId4" imgW="1270000" imgH="457200" progId="Equation.DSMT4">
                   <p:embed/>
                 </p:oleObj>
               </mc:Choice>
@@ -12882,7 +12965,7 @@
           <a:graphicData uri="http://schemas.openxmlformats.org/presentationml/2006/ole">
             <mc:AlternateContent xmlns:mc="http://schemas.openxmlformats.org/markup-compatibility/2006">
               <mc:Choice xmlns:v="urn:schemas-microsoft-com:vml" Requires="v">
-                <p:oleObj spid="_x0000_s9510" name="Equation" r:id="rId6" imgW="1270000" imgH="457200" progId="Equation.DSMT4">
+                <p:oleObj spid="_x0000_s9517" name="Equation" r:id="rId6" imgW="1270000" imgH="457200" progId="Equation.DSMT4">
                   <p:embed/>
                 </p:oleObj>
               </mc:Choice>
@@ -13049,7 +13132,7 @@
           <a:graphicData uri="http://schemas.openxmlformats.org/presentationml/2006/ole">
             <mc:AlternateContent xmlns:mc="http://schemas.openxmlformats.org/markup-compatibility/2006">
               <mc:Choice xmlns:v="urn:schemas-microsoft-com:vml" Requires="v">
-                <p:oleObj spid="_x0000_s9511" name="Equation" r:id="rId8" imgW="774360" imgH="203040" progId="Equation.DSMT4">
+                <p:oleObj spid="_x0000_s9518" name="Equation" r:id="rId8" imgW="774360" imgH="203040" progId="Equation.DSMT4">
                   <p:embed/>
                 </p:oleObj>
               </mc:Choice>
@@ -13626,7 +13709,7 @@
             <a:graphicData uri="http://schemas.openxmlformats.org/presentationml/2006/ole">
               <mc:AlternateContent xmlns:mc="http://schemas.openxmlformats.org/markup-compatibility/2006">
                 <mc:Choice xmlns:v="urn:schemas-microsoft-com:vml" Requires="v">
-                  <p:oleObj spid="_x0000_s10444" name="Equation" r:id="rId4" imgW="774360" imgH="203040" progId="Equation.DSMT4">
+                  <p:oleObj spid="_x0000_s10449" name="Equation" r:id="rId4" imgW="774360" imgH="203040" progId="Equation.DSMT4">
                     <p:embed/>
                   </p:oleObj>
                 </mc:Choice>
@@ -13791,7 +13874,7 @@
             <a:graphicData uri="http://schemas.openxmlformats.org/presentationml/2006/ole">
               <mc:AlternateContent xmlns:mc="http://schemas.openxmlformats.org/markup-compatibility/2006">
                 <mc:Choice xmlns:v="urn:schemas-microsoft-com:vml" Requires="v">
-                  <p:oleObj spid="_x0000_s10445" name="Equation" r:id="rId6" imgW="736560" imgH="203040" progId="Equation.DSMT4">
+                  <p:oleObj spid="_x0000_s10450" name="Equation" r:id="rId6" imgW="736560" imgH="203040" progId="Equation.DSMT4">
                     <p:embed/>
                   </p:oleObj>
                 </mc:Choice>
@@ -14642,7 +14725,7 @@
           <a:graphicData uri="http://schemas.openxmlformats.org/presentationml/2006/ole">
             <mc:AlternateContent xmlns:mc="http://schemas.openxmlformats.org/markup-compatibility/2006">
               <mc:Choice xmlns:v="urn:schemas-microsoft-com:vml" Requires="v">
-                <p:oleObj spid="_x0000_s11470" name="Equation" r:id="rId4" imgW="114120" imgH="177480" progId="Equation.DSMT4">
+                <p:oleObj spid="_x0000_s11475" name="Equation" r:id="rId4" imgW="114120" imgH="177480" progId="Equation.DSMT4">
                   <p:embed/>
                 </p:oleObj>
               </mc:Choice>
@@ -14712,7 +14795,7 @@
           <a:graphicData uri="http://schemas.openxmlformats.org/presentationml/2006/ole">
             <mc:AlternateContent xmlns:mc="http://schemas.openxmlformats.org/markup-compatibility/2006">
               <mc:Choice xmlns:v="urn:schemas-microsoft-com:vml" Requires="v">
-                <p:oleObj spid="_x0000_s11471" name="Equation" r:id="rId6" imgW="114120" imgH="177480" progId="Equation.DSMT4">
+                <p:oleObj spid="_x0000_s11476" name="Equation" r:id="rId6" imgW="114120" imgH="177480" progId="Equation.DSMT4">
                   <p:embed/>
                 </p:oleObj>
               </mc:Choice>
@@ -15928,7 +16011,7 @@
           <a:graphicData uri="http://schemas.openxmlformats.org/presentationml/2006/ole">
             <mc:AlternateContent xmlns:mc="http://schemas.openxmlformats.org/markup-compatibility/2006">
               <mc:Choice xmlns:v="urn:schemas-microsoft-com:vml" Requires="v">
-                <p:oleObj spid="_x0000_s184439" name="Equation" r:id="rId4" imgW="2552700" imgH="419100" progId="Equation.DSMT4">
+                <p:oleObj spid="_x0000_s184442" name="Equation" r:id="rId4" imgW="2552700" imgH="419100" progId="Equation.DSMT4">
                   <p:embed/>
                 </p:oleObj>
               </mc:Choice>
@@ -16602,7 +16685,7 @@
           <a:graphicData uri="http://schemas.openxmlformats.org/presentationml/2006/ole">
             <mc:AlternateContent xmlns:mc="http://schemas.openxmlformats.org/markup-compatibility/2006">
               <mc:Choice xmlns:v="urn:schemas-microsoft-com:vml" Requires="v">
-                <p:oleObj spid="_x0000_s12407" name="Equation" r:id="rId4" imgW="2590560" imgH="368280" progId="Equation.DSMT4">
+                <p:oleObj spid="_x0000_s12410" name="Equation" r:id="rId4" imgW="2590560" imgH="368280" progId="Equation.DSMT4">
                   <p:embed/>
                 </p:oleObj>
               </mc:Choice>
@@ -17501,7 +17584,7 @@
           <a:graphicData uri="http://schemas.openxmlformats.org/presentationml/2006/ole">
             <mc:AlternateContent xmlns:mc="http://schemas.openxmlformats.org/markup-compatibility/2006">
               <mc:Choice xmlns:v="urn:schemas-microsoft-com:vml" Requires="v">
-                <p:oleObj spid="_x0000_s13431" name="Equation" r:id="rId4" imgW="152280" imgH="393480" progId="Equation.DSMT4">
+                <p:oleObj spid="_x0000_s13434" name="Equation" r:id="rId4" imgW="152280" imgH="393480" progId="Equation.DSMT4">
                   <p:embed/>
                 </p:oleObj>
               </mc:Choice>
@@ -18636,7 +18719,7 @@
           <a:graphicData uri="http://schemas.openxmlformats.org/presentationml/2006/ole">
             <mc:AlternateContent xmlns:mc="http://schemas.openxmlformats.org/markup-compatibility/2006">
               <mc:Choice xmlns:v="urn:schemas-microsoft-com:vml" Requires="v">
-                <p:oleObj spid="_x0000_s150647" name="Equation" r:id="rId4" imgW="838200" imgH="241300" progId="Equation.DSMT4">
+                <p:oleObj spid="_x0000_s150650" name="Equation" r:id="rId4" imgW="838200" imgH="241300" progId="Equation.DSMT4">
                   <p:embed/>
                 </p:oleObj>
               </mc:Choice>
@@ -19305,7 +19388,7 @@
           <a:graphicData uri="http://schemas.openxmlformats.org/presentationml/2006/ole">
             <mc:AlternateContent xmlns:mc="http://schemas.openxmlformats.org/markup-compatibility/2006">
               <mc:Choice xmlns:v="urn:schemas-microsoft-com:vml" Requires="v">
-                <p:oleObj spid="_x0000_s6352" name="Equation" r:id="rId4" imgW="304560" imgH="139680" progId="Equation.DSMT4">
+                <p:oleObj spid="_x0000_s6357" name="Equation" r:id="rId4" imgW="304560" imgH="139680" progId="Equation.DSMT4">
                   <p:embed/>
                 </p:oleObj>
               </mc:Choice>
@@ -19375,7 +19458,7 @@
           <a:graphicData uri="http://schemas.openxmlformats.org/presentationml/2006/ole">
             <mc:AlternateContent xmlns:mc="http://schemas.openxmlformats.org/markup-compatibility/2006">
               <mc:Choice xmlns:v="urn:schemas-microsoft-com:vml" Requires="v">
-                <p:oleObj spid="_x0000_s6353" name="Equation" r:id="rId6" imgW="304560" imgH="139680" progId="Equation.DSMT4">
+                <p:oleObj spid="_x0000_s6358" name="Equation" r:id="rId6" imgW="304560" imgH="139680" progId="Equation.DSMT4">
                   <p:embed/>
                 </p:oleObj>
               </mc:Choice>
@@ -22435,7 +22518,7 @@
           <a:graphicData uri="http://schemas.openxmlformats.org/presentationml/2006/ole">
             <mc:AlternateContent xmlns:mc="http://schemas.openxmlformats.org/markup-compatibility/2006">
               <mc:Choice xmlns:v="urn:schemas-microsoft-com:vml" Requires="v">
-                <p:oleObj spid="_x0000_s7370" name="Equation" r:id="rId4" imgW="304560" imgH="139680" progId="Equation.DSMT4">
+                <p:oleObj spid="_x0000_s7375" name="Equation" r:id="rId4" imgW="304560" imgH="139680" progId="Equation.DSMT4">
                   <p:embed/>
                 </p:oleObj>
               </mc:Choice>
@@ -22505,7 +22588,7 @@
           <a:graphicData uri="http://schemas.openxmlformats.org/presentationml/2006/ole">
             <mc:AlternateContent xmlns:mc="http://schemas.openxmlformats.org/markup-compatibility/2006">
               <mc:Choice xmlns:v="urn:schemas-microsoft-com:vml" Requires="v">
-                <p:oleObj spid="_x0000_s7371" name="Equation" r:id="rId6" imgW="304560" imgH="139680" progId="Equation.DSMT4">
+                <p:oleObj spid="_x0000_s7376" name="Equation" r:id="rId6" imgW="304560" imgH="139680" progId="Equation.DSMT4">
                   <p:embed/>
                 </p:oleObj>
               </mc:Choice>
@@ -22914,7 +22997,7 @@
           <a:graphicData uri="http://schemas.openxmlformats.org/presentationml/2006/ole">
             <mc:AlternateContent xmlns:mc="http://schemas.openxmlformats.org/markup-compatibility/2006">
               <mc:Choice xmlns:v="urn:schemas-microsoft-com:vml" Requires="v">
-                <p:oleObj spid="_x0000_s210067" name="Equation" r:id="rId4" imgW="114120" imgH="177480" progId="Equation.DSMT4">
+                <p:oleObj spid="_x0000_s210072" name="Equation" r:id="rId4" imgW="114120" imgH="177480" progId="Equation.DSMT4">
                   <p:embed/>
                 </p:oleObj>
               </mc:Choice>
@@ -23519,7 +23602,7 @@
           <a:graphicData uri="http://schemas.openxmlformats.org/presentationml/2006/ole">
             <mc:AlternateContent xmlns:mc="http://schemas.openxmlformats.org/markup-compatibility/2006">
               <mc:Choice xmlns:v="urn:schemas-microsoft-com:vml" Requires="v">
-                <p:oleObj spid="_x0000_s210068" name="Equation" r:id="rId6" imgW="635000" imgH="469900" progId="Equation.DSMT4">
+                <p:oleObj spid="_x0000_s210073" name="Equation" r:id="rId6" imgW="635000" imgH="469900" progId="Equation.DSMT4">
                   <p:embed/>
                 </p:oleObj>
               </mc:Choice>
@@ -23755,7 +23838,7 @@
           <a:graphicData uri="http://schemas.openxmlformats.org/presentationml/2006/ole">
             <mc:AlternateContent xmlns:mc="http://schemas.openxmlformats.org/markup-compatibility/2006">
               <mc:Choice xmlns:v="urn:schemas-microsoft-com:vml" Requires="v">
-                <p:oleObj spid="_x0000_s219185" name="Equation" r:id="rId4" imgW="114120" imgH="177480" progId="Equation.DSMT4">
+                <p:oleObj spid="_x0000_s219190" name="Equation" r:id="rId4" imgW="114120" imgH="177480" progId="Equation.DSMT4">
                   <p:embed/>
                 </p:oleObj>
               </mc:Choice>
@@ -24434,7 +24517,7 @@
           <a:graphicData uri="http://schemas.openxmlformats.org/presentationml/2006/ole">
             <mc:AlternateContent xmlns:mc="http://schemas.openxmlformats.org/markup-compatibility/2006">
               <mc:Choice xmlns:v="urn:schemas-microsoft-com:vml" Requires="v">
-                <p:oleObj spid="_x0000_s219186" name="Equation" r:id="rId6" imgW="635000" imgH="444500" progId="Equation.DSMT4">
+                <p:oleObj spid="_x0000_s219191" name="Equation" r:id="rId6" imgW="635000" imgH="444500" progId="Equation.DSMT4">
                   <p:embed/>
                 </p:oleObj>
               </mc:Choice>

</xml_diff>